<commit_message>
ajout courbe sans carter - séquence de vol
</commit_message>
<xml_diff>
--- a/01_doc/Schéma fonctionnel/Schéma du projet.pptx
+++ b/01_doc/Schéma fonctionnel/Schéma du projet.pptx
@@ -104,6 +104,11 @@
       </a:defRPr>
     </a:lvl9pPr>
   </p:defaultTextStyle>
+  <p:extLst>
+    <p:ext uri="{EFAFB233-063F-42B5-8137-9DF3F51BA10A}">
+      <p15:sldGuideLst xmlns:p15="http://schemas.microsoft.com/office/powerpoint/2012/main"/>
+    </p:ext>
+  </p:extLst>
 </p:presentation>
 </file>
 
@@ -254,7 +259,7 @@
           <a:p>
             <a:fld id="{5EF64A03-C257-4CA5-9616-85CF8D5B1383}" type="datetimeFigureOut">
               <a:rPr lang="fr-FR" smtClean="0"/>
-              <a:t>27/01/2023</a:t>
+              <a:t>30/01/2023</a:t>
             </a:fld>
             <a:endParaRPr lang="fr-FR"/>
           </a:p>
@@ -452,7 +457,7 @@
           <a:p>
             <a:fld id="{5EF64A03-C257-4CA5-9616-85CF8D5B1383}" type="datetimeFigureOut">
               <a:rPr lang="fr-FR" smtClean="0"/>
-              <a:t>27/01/2023</a:t>
+              <a:t>30/01/2023</a:t>
             </a:fld>
             <a:endParaRPr lang="fr-FR"/>
           </a:p>
@@ -660,7 +665,7 @@
           <a:p>
             <a:fld id="{5EF64A03-C257-4CA5-9616-85CF8D5B1383}" type="datetimeFigureOut">
               <a:rPr lang="fr-FR" smtClean="0"/>
-              <a:t>27/01/2023</a:t>
+              <a:t>30/01/2023</a:t>
             </a:fld>
             <a:endParaRPr lang="fr-FR"/>
           </a:p>
@@ -858,7 +863,7 @@
           <a:p>
             <a:fld id="{5EF64A03-C257-4CA5-9616-85CF8D5B1383}" type="datetimeFigureOut">
               <a:rPr lang="fr-FR" smtClean="0"/>
-              <a:t>27/01/2023</a:t>
+              <a:t>30/01/2023</a:t>
             </a:fld>
             <a:endParaRPr lang="fr-FR"/>
           </a:p>
@@ -1133,7 +1138,7 @@
           <a:p>
             <a:fld id="{5EF64A03-C257-4CA5-9616-85CF8D5B1383}" type="datetimeFigureOut">
               <a:rPr lang="fr-FR" smtClean="0"/>
-              <a:t>27/01/2023</a:t>
+              <a:t>30/01/2023</a:t>
             </a:fld>
             <a:endParaRPr lang="fr-FR"/>
           </a:p>
@@ -1398,7 +1403,7 @@
           <a:p>
             <a:fld id="{5EF64A03-C257-4CA5-9616-85CF8D5B1383}" type="datetimeFigureOut">
               <a:rPr lang="fr-FR" smtClean="0"/>
-              <a:t>27/01/2023</a:t>
+              <a:t>30/01/2023</a:t>
             </a:fld>
             <a:endParaRPr lang="fr-FR"/>
           </a:p>
@@ -1810,7 +1815,7 @@
           <a:p>
             <a:fld id="{5EF64A03-C257-4CA5-9616-85CF8D5B1383}" type="datetimeFigureOut">
               <a:rPr lang="fr-FR" smtClean="0"/>
-              <a:t>27/01/2023</a:t>
+              <a:t>30/01/2023</a:t>
             </a:fld>
             <a:endParaRPr lang="fr-FR"/>
           </a:p>
@@ -1951,7 +1956,7 @@
           <a:p>
             <a:fld id="{5EF64A03-C257-4CA5-9616-85CF8D5B1383}" type="datetimeFigureOut">
               <a:rPr lang="fr-FR" smtClean="0"/>
-              <a:t>27/01/2023</a:t>
+              <a:t>30/01/2023</a:t>
             </a:fld>
             <a:endParaRPr lang="fr-FR"/>
           </a:p>
@@ -2064,7 +2069,7 @@
           <a:p>
             <a:fld id="{5EF64A03-C257-4CA5-9616-85CF8D5B1383}" type="datetimeFigureOut">
               <a:rPr lang="fr-FR" smtClean="0"/>
-              <a:t>27/01/2023</a:t>
+              <a:t>30/01/2023</a:t>
             </a:fld>
             <a:endParaRPr lang="fr-FR"/>
           </a:p>
@@ -2375,7 +2380,7 @@
           <a:p>
             <a:fld id="{5EF64A03-C257-4CA5-9616-85CF8D5B1383}" type="datetimeFigureOut">
               <a:rPr lang="fr-FR" smtClean="0"/>
-              <a:t>27/01/2023</a:t>
+              <a:t>30/01/2023</a:t>
             </a:fld>
             <a:endParaRPr lang="fr-FR"/>
           </a:p>
@@ -2663,7 +2668,7 @@
           <a:p>
             <a:fld id="{5EF64A03-C257-4CA5-9616-85CF8D5B1383}" type="datetimeFigureOut">
               <a:rPr lang="fr-FR" smtClean="0"/>
-              <a:t>27/01/2023</a:t>
+              <a:t>30/01/2023</a:t>
             </a:fld>
             <a:endParaRPr lang="fr-FR"/>
           </a:p>
@@ -2904,7 +2909,7 @@
           <a:p>
             <a:fld id="{5EF64A03-C257-4CA5-9616-85CF8D5B1383}" type="datetimeFigureOut">
               <a:rPr lang="fr-FR" smtClean="0"/>
-              <a:t>27/01/2023</a:t>
+              <a:t>30/01/2023</a:t>
             </a:fld>
             <a:endParaRPr lang="fr-FR"/>
           </a:p>
@@ -4298,6 +4303,357 @@
           </a:p>
         </p:txBody>
       </p:sp>
+      <p:cxnSp>
+        <p:nvCxnSpPr>
+          <p:cNvPr id="3" name="Connecteur droit 2">
+            <a:extLst>
+              <a:ext uri="{FF2B5EF4-FFF2-40B4-BE49-F238E27FC236}">
+                <a16:creationId xmlns:a16="http://schemas.microsoft.com/office/drawing/2014/main" id="{CA315638-C53B-189D-042D-4A9401398A75}"/>
+              </a:ext>
+            </a:extLst>
+          </p:cNvPr>
+          <p:cNvCxnSpPr/>
+          <p:nvPr/>
+        </p:nvCxnSpPr>
+        <p:spPr>
+          <a:xfrm>
+            <a:off x="8717872" y="4421080"/>
+            <a:ext cx="2201662" cy="0"/>
+          </a:xfrm>
+          <a:prstGeom prst="line">
+            <a:avLst/>
+          </a:prstGeom>
+        </p:spPr>
+        <p:style>
+          <a:lnRef idx="1">
+            <a:schemeClr val="accent1"/>
+          </a:lnRef>
+          <a:fillRef idx="0">
+            <a:schemeClr val="accent1"/>
+          </a:fillRef>
+          <a:effectRef idx="0">
+            <a:schemeClr val="accent1"/>
+          </a:effectRef>
+          <a:fontRef idx="minor">
+            <a:schemeClr val="tx1"/>
+          </a:fontRef>
+        </p:style>
+      </p:cxnSp>
+      <p:cxnSp>
+        <p:nvCxnSpPr>
+          <p:cNvPr id="4" name="Connecteur droit 3">
+            <a:extLst>
+              <a:ext uri="{FF2B5EF4-FFF2-40B4-BE49-F238E27FC236}">
+                <a16:creationId xmlns:a16="http://schemas.microsoft.com/office/drawing/2014/main" id="{2FD407DA-5E2B-F249-7D61-48766C69CF13}"/>
+              </a:ext>
+            </a:extLst>
+          </p:cNvPr>
+          <p:cNvCxnSpPr>
+            <a:cxnSpLocks/>
+          </p:cNvCxnSpPr>
+          <p:nvPr/>
+        </p:nvCxnSpPr>
+        <p:spPr>
+          <a:xfrm flipV="1">
+            <a:off x="8873712" y="4328602"/>
+            <a:ext cx="221942" cy="184955"/>
+          </a:xfrm>
+          <a:prstGeom prst="line">
+            <a:avLst/>
+          </a:prstGeom>
+        </p:spPr>
+        <p:style>
+          <a:lnRef idx="1">
+            <a:schemeClr val="accent1"/>
+          </a:lnRef>
+          <a:fillRef idx="0">
+            <a:schemeClr val="accent1"/>
+          </a:fillRef>
+          <a:effectRef idx="0">
+            <a:schemeClr val="accent1"/>
+          </a:effectRef>
+          <a:fontRef idx="minor">
+            <a:schemeClr val="tx1"/>
+          </a:fontRef>
+        </p:style>
+      </p:cxnSp>
+      <p:cxnSp>
+        <p:nvCxnSpPr>
+          <p:cNvPr id="14" name="Connecteur droit 13">
+            <a:extLst>
+              <a:ext uri="{FF2B5EF4-FFF2-40B4-BE49-F238E27FC236}">
+                <a16:creationId xmlns:a16="http://schemas.microsoft.com/office/drawing/2014/main" id="{20326224-3E9E-D96D-8C36-7FE847FD59DB}"/>
+              </a:ext>
+            </a:extLst>
+          </p:cNvPr>
+          <p:cNvCxnSpPr>
+            <a:cxnSpLocks/>
+          </p:cNvCxnSpPr>
+          <p:nvPr/>
+        </p:nvCxnSpPr>
+        <p:spPr>
+          <a:xfrm flipV="1">
+            <a:off x="10565270" y="4328601"/>
+            <a:ext cx="221942" cy="184955"/>
+          </a:xfrm>
+          <a:prstGeom prst="line">
+            <a:avLst/>
+          </a:prstGeom>
+        </p:spPr>
+        <p:style>
+          <a:lnRef idx="1">
+            <a:schemeClr val="accent1"/>
+          </a:lnRef>
+          <a:fillRef idx="0">
+            <a:schemeClr val="accent1"/>
+          </a:fillRef>
+          <a:effectRef idx="0">
+            <a:schemeClr val="accent1"/>
+          </a:effectRef>
+          <a:fontRef idx="minor">
+            <a:schemeClr val="tx1"/>
+          </a:fontRef>
+        </p:style>
+      </p:cxnSp>
+      <p:cxnSp>
+        <p:nvCxnSpPr>
+          <p:cNvPr id="15" name="Connecteur droit 14">
+            <a:extLst>
+              <a:ext uri="{FF2B5EF4-FFF2-40B4-BE49-F238E27FC236}">
+                <a16:creationId xmlns:a16="http://schemas.microsoft.com/office/drawing/2014/main" id="{8A6ACDD7-67AF-A821-94D2-6675B02B4DAF}"/>
+              </a:ext>
+            </a:extLst>
+          </p:cNvPr>
+          <p:cNvCxnSpPr>
+            <a:cxnSpLocks/>
+          </p:cNvCxnSpPr>
+          <p:nvPr/>
+        </p:nvCxnSpPr>
+        <p:spPr>
+          <a:xfrm flipV="1">
+            <a:off x="9818703" y="2712792"/>
+            <a:ext cx="0" cy="1708286"/>
+          </a:xfrm>
+          <a:prstGeom prst="line">
+            <a:avLst/>
+          </a:prstGeom>
+        </p:spPr>
+        <p:style>
+          <a:lnRef idx="1">
+            <a:schemeClr val="accent1"/>
+          </a:lnRef>
+          <a:fillRef idx="0">
+            <a:schemeClr val="accent1"/>
+          </a:fillRef>
+          <a:effectRef idx="0">
+            <a:schemeClr val="accent1"/>
+          </a:effectRef>
+          <a:fontRef idx="minor">
+            <a:schemeClr val="tx1"/>
+          </a:fontRef>
+        </p:style>
+      </p:cxnSp>
+      <p:cxnSp>
+        <p:nvCxnSpPr>
+          <p:cNvPr id="18" name="Connecteur droit 17">
+            <a:extLst>
+              <a:ext uri="{FF2B5EF4-FFF2-40B4-BE49-F238E27FC236}">
+                <a16:creationId xmlns:a16="http://schemas.microsoft.com/office/drawing/2014/main" id="{AE704F61-4FD3-204B-72E2-ED0F099FF9BE}"/>
+              </a:ext>
+            </a:extLst>
+          </p:cNvPr>
+          <p:cNvCxnSpPr>
+            <a:cxnSpLocks/>
+          </p:cNvCxnSpPr>
+          <p:nvPr/>
+        </p:nvCxnSpPr>
+        <p:spPr>
+          <a:xfrm flipH="1" flipV="1">
+            <a:off x="9588690" y="2403134"/>
+            <a:ext cx="1087551" cy="1461060"/>
+          </a:xfrm>
+          <a:prstGeom prst="line">
+            <a:avLst/>
+          </a:prstGeom>
+        </p:spPr>
+        <p:style>
+          <a:lnRef idx="1">
+            <a:schemeClr val="accent1"/>
+          </a:lnRef>
+          <a:fillRef idx="0">
+            <a:schemeClr val="accent1"/>
+          </a:fillRef>
+          <a:effectRef idx="0">
+            <a:schemeClr val="accent1"/>
+          </a:effectRef>
+          <a:fontRef idx="minor">
+            <a:schemeClr val="tx1"/>
+          </a:fontRef>
+        </p:style>
+      </p:cxnSp>
+      <p:sp>
+        <p:nvSpPr>
+          <p:cNvPr id="21" name="Ellipse 20">
+            <a:extLst>
+              <a:ext uri="{FF2B5EF4-FFF2-40B4-BE49-F238E27FC236}">
+                <a16:creationId xmlns:a16="http://schemas.microsoft.com/office/drawing/2014/main" id="{909A0F03-B55C-B35E-1218-71821EA7EE3E}"/>
+              </a:ext>
+            </a:extLst>
+          </p:cNvPr>
+          <p:cNvSpPr/>
+          <p:nvPr/>
+        </p:nvSpPr>
+        <p:spPr>
+          <a:xfrm>
+            <a:off x="10565271" y="3811289"/>
+            <a:ext cx="221940" cy="181200"/>
+          </a:xfrm>
+          <a:prstGeom prst="ellipse">
+            <a:avLst/>
+          </a:prstGeom>
+          <a:ln>
+            <a:solidFill>
+              <a:schemeClr val="accent1"/>
+            </a:solidFill>
+          </a:ln>
+        </p:spPr>
+        <p:style>
+          <a:lnRef idx="2">
+            <a:schemeClr val="accent6"/>
+          </a:lnRef>
+          <a:fillRef idx="1">
+            <a:schemeClr val="lt1"/>
+          </a:fillRef>
+          <a:effectRef idx="0">
+            <a:schemeClr val="accent6"/>
+          </a:effectRef>
+          <a:fontRef idx="minor">
+            <a:schemeClr val="dk1"/>
+          </a:fontRef>
+        </p:style>
+        <p:txBody>
+          <a:bodyPr rtlCol="0" anchor="ctr"/>
+          <a:lstStyle/>
+          <a:p>
+            <a:pPr algn="ctr"/>
+            <a:endParaRPr lang="fr-FR"/>
+          </a:p>
+        </p:txBody>
+      </p:sp>
+      <p:cxnSp>
+        <p:nvCxnSpPr>
+          <p:cNvPr id="22" name="Connecteur droit 21">
+            <a:extLst>
+              <a:ext uri="{FF2B5EF4-FFF2-40B4-BE49-F238E27FC236}">
+                <a16:creationId xmlns:a16="http://schemas.microsoft.com/office/drawing/2014/main" id="{4BF931D2-94F2-C53D-961F-134298236955}"/>
+              </a:ext>
+            </a:extLst>
+          </p:cNvPr>
+          <p:cNvCxnSpPr>
+            <a:cxnSpLocks/>
+          </p:cNvCxnSpPr>
+          <p:nvPr/>
+        </p:nvCxnSpPr>
+        <p:spPr>
+          <a:xfrm flipV="1">
+            <a:off x="10454299" y="3911442"/>
+            <a:ext cx="221942" cy="184955"/>
+          </a:xfrm>
+          <a:prstGeom prst="line">
+            <a:avLst/>
+          </a:prstGeom>
+        </p:spPr>
+        <p:style>
+          <a:lnRef idx="1">
+            <a:schemeClr val="accent1"/>
+          </a:lnRef>
+          <a:fillRef idx="0">
+            <a:schemeClr val="accent1"/>
+          </a:fillRef>
+          <a:effectRef idx="0">
+            <a:schemeClr val="accent1"/>
+          </a:effectRef>
+          <a:fontRef idx="minor">
+            <a:schemeClr val="tx1"/>
+          </a:fontRef>
+        </p:style>
+      </p:cxnSp>
+      <p:cxnSp>
+        <p:nvCxnSpPr>
+          <p:cNvPr id="23" name="Connecteur droit 22">
+            <a:extLst>
+              <a:ext uri="{FF2B5EF4-FFF2-40B4-BE49-F238E27FC236}">
+                <a16:creationId xmlns:a16="http://schemas.microsoft.com/office/drawing/2014/main" id="{B3921E5A-35E2-3BA2-7F98-10BA888BD28A}"/>
+              </a:ext>
+            </a:extLst>
+          </p:cNvPr>
+          <p:cNvCxnSpPr>
+            <a:cxnSpLocks/>
+          </p:cNvCxnSpPr>
+          <p:nvPr/>
+        </p:nvCxnSpPr>
+        <p:spPr>
+          <a:xfrm flipH="1" flipV="1">
+            <a:off x="10523841" y="3746602"/>
+            <a:ext cx="152400" cy="163830"/>
+          </a:xfrm>
+          <a:prstGeom prst="line">
+            <a:avLst/>
+          </a:prstGeom>
+        </p:spPr>
+        <p:style>
+          <a:lnRef idx="1">
+            <a:schemeClr val="accent1"/>
+          </a:lnRef>
+          <a:fillRef idx="0">
+            <a:schemeClr val="accent1"/>
+          </a:fillRef>
+          <a:effectRef idx="0">
+            <a:schemeClr val="accent1"/>
+          </a:effectRef>
+          <a:fontRef idx="minor">
+            <a:schemeClr val="tx1"/>
+          </a:fontRef>
+        </p:style>
+      </p:cxnSp>
+      <p:cxnSp>
+        <p:nvCxnSpPr>
+          <p:cNvPr id="25" name="Connecteur droit 24">
+            <a:extLst>
+              <a:ext uri="{FF2B5EF4-FFF2-40B4-BE49-F238E27FC236}">
+                <a16:creationId xmlns:a16="http://schemas.microsoft.com/office/drawing/2014/main" id="{A08D73BD-6F81-B22C-5E9F-A5D9C814E580}"/>
+              </a:ext>
+            </a:extLst>
+          </p:cNvPr>
+          <p:cNvCxnSpPr>
+            <a:cxnSpLocks/>
+          </p:cNvCxnSpPr>
+          <p:nvPr/>
+        </p:nvCxnSpPr>
+        <p:spPr>
+          <a:xfrm>
+            <a:off x="10676241" y="3921483"/>
+            <a:ext cx="284086" cy="0"/>
+          </a:xfrm>
+          <a:prstGeom prst="line">
+            <a:avLst/>
+          </a:prstGeom>
+        </p:spPr>
+        <p:style>
+          <a:lnRef idx="1">
+            <a:schemeClr val="accent1"/>
+          </a:lnRef>
+          <a:fillRef idx="0">
+            <a:schemeClr val="accent1"/>
+          </a:fillRef>
+          <a:effectRef idx="0">
+            <a:schemeClr val="accent1"/>
+          </a:effectRef>
+          <a:fontRef idx="minor">
+            <a:schemeClr val="tx1"/>
+          </a:fontRef>
+        </p:style>
+      </p:cxnSp>
     </p:spTree>
     <p:extLst>
       <p:ext uri="{BB962C8B-B14F-4D97-AF65-F5344CB8AC3E}">

</xml_diff>